<commit_message>
PPT => NG 8
</commit_message>
<xml_diff>
--- a/PPT/Angular01-Intro.pptx
+++ b/PPT/Angular01-Intro.pptx
@@ -5,10 +5,10 @@
     <p:sldMasterId id="2147483653" r:id="rId1"/>
   </p:sldMasterIdLst>
   <p:notesMasterIdLst>
-    <p:notesMasterId r:id="rId18"/>
+    <p:notesMasterId r:id="rId17"/>
   </p:notesMasterIdLst>
   <p:handoutMasterIdLst>
-    <p:handoutMasterId r:id="rId19"/>
+    <p:handoutMasterId r:id="rId18"/>
   </p:handoutMasterIdLst>
   <p:sldIdLst>
     <p:sldId id="264" r:id="rId2"/>
@@ -25,8 +25,7 @@
     <p:sldId id="309" r:id="rId13"/>
     <p:sldId id="310" r:id="rId14"/>
     <p:sldId id="311" r:id="rId15"/>
-    <p:sldId id="313" r:id="rId16"/>
-    <p:sldId id="314" r:id="rId17"/>
+    <p:sldId id="314" r:id="rId16"/>
   </p:sldIdLst>
   <p:sldSz cx="9144000" cy="6858000" type="screen4x3"/>
   <p:notesSz cx="6648450" cy="9782175"/>
@@ -5088,162 +5087,6 @@
       </p:grpSpPr>
       <p:sp>
         <p:nvSpPr>
-          <p:cNvPr id="3" name="Espace réservé du contenu 2"/>
-          <p:cNvSpPr>
-            <a:spLocks noGrp="1"/>
-          </p:cNvSpPr>
-          <p:nvPr>
-            <p:ph idx="1"/>
-          </p:nvPr>
-        </p:nvSpPr>
-        <p:spPr/>
-        <p:txBody>
-          <a:bodyPr/>
-          <a:lstStyle/>
-          <a:p>
-            <a:r>
-              <a:rPr lang="fr-FR" dirty="0" smtClean="0"/>
-              <a:t>Les navigateurs ne connaissent pas TS</a:t>
-            </a:r>
-          </a:p>
-          <a:p>
-            <a:r>
-              <a:rPr lang="fr-FR" dirty="0" smtClean="0"/>
-              <a:t>2 solutions</a:t>
-            </a:r>
-          </a:p>
-          <a:p>
-            <a:pPr lvl="1"/>
-            <a:r>
-              <a:rPr lang="fr-FR" dirty="0" err="1" smtClean="0"/>
-              <a:t>Transpilation</a:t>
-            </a:r>
-            <a:r>
-              <a:rPr lang="fr-FR" dirty="0" smtClean="0"/>
-              <a:t> dans le navigateur (facile à débugger)</a:t>
-            </a:r>
-          </a:p>
-          <a:p>
-            <a:pPr lvl="1"/>
-            <a:r>
-              <a:rPr lang="fr-FR" dirty="0" err="1" smtClean="0"/>
-              <a:t>Transpilation</a:t>
-            </a:r>
-            <a:r>
-              <a:rPr lang="fr-FR" dirty="0" smtClean="0"/>
-              <a:t> coté serveur (rapide en production)</a:t>
-            </a:r>
-          </a:p>
-          <a:p>
-            <a:pPr lvl="1"/>
-            <a:endParaRPr lang="fr-FR" dirty="0"/>
-          </a:p>
-        </p:txBody>
-      </p:sp>
-      <p:pic>
-        <p:nvPicPr>
-          <p:cNvPr id="1026" name="Picture 2" descr="Logo."/>
-          <p:cNvPicPr>
-            <a:picLocks noChangeAspect="1" noChangeArrowheads="1"/>
-          </p:cNvPicPr>
-          <p:nvPr/>
-        </p:nvPicPr>
-        <p:blipFill>
-          <a:blip r:embed="rId2">
-            <a:extLst>
-              <a:ext uri="{28A0092B-C50C-407E-A947-70E740481C1C}">
-                <a14:useLocalDpi xmlns:a14="http://schemas.microsoft.com/office/drawing/2010/main" val="0"/>
-              </a:ext>
-            </a:extLst>
-          </a:blip>
-          <a:srcRect/>
-          <a:stretch>
-            <a:fillRect/>
-          </a:stretch>
-        </p:blipFill>
-        <p:spPr bwMode="auto">
-          <a:xfrm>
-            <a:off x="3707904" y="294196"/>
-            <a:ext cx="2381250" cy="581026"/>
-          </a:xfrm>
-          <a:prstGeom prst="rect">
-            <a:avLst/>
-          </a:prstGeom>
-          <a:noFill/>
-          <a:extLst>
-            <a:ext uri="{909E8E84-426E-40DD-AFC4-6F175D3DCCD1}">
-              <a14:hiddenFill xmlns:a14="http://schemas.microsoft.com/office/drawing/2010/main">
-                <a:solidFill>
-                  <a:srgbClr val="FFFFFF"/>
-                </a:solidFill>
-              </a14:hiddenFill>
-            </a:ext>
-          </a:extLst>
-        </p:spPr>
-      </p:pic>
-      <p:pic>
-        <p:nvPicPr>
-          <p:cNvPr id="2" name="Image 1"/>
-          <p:cNvPicPr>
-            <a:picLocks noChangeAspect="1"/>
-          </p:cNvPicPr>
-          <p:nvPr/>
-        </p:nvPicPr>
-        <p:blipFill>
-          <a:blip r:embed="rId3"/>
-          <a:stretch>
-            <a:fillRect/>
-          </a:stretch>
-        </p:blipFill>
-        <p:spPr>
-          <a:xfrm>
-            <a:off x="468677" y="3582775"/>
-            <a:ext cx="8187719" cy="2903215"/>
-          </a:xfrm>
-          <a:prstGeom prst="rect">
-            <a:avLst/>
-          </a:prstGeom>
-        </p:spPr>
-      </p:pic>
-    </p:spTree>
-    <p:extLst>
-      <p:ext uri="{BB962C8B-B14F-4D97-AF65-F5344CB8AC3E}">
-        <p14:creationId xmlns:p14="http://schemas.microsoft.com/office/powerpoint/2010/main" val="1150951126"/>
-      </p:ext>
-    </p:extLst>
-  </p:cSld>
-  <p:clrMapOvr>
-    <a:masterClrMapping/>
-  </p:clrMapOvr>
-  <p:timing>
-    <p:tnLst>
-      <p:par>
-        <p:cTn id="1" dur="indefinite" restart="never" nodeType="tmRoot"/>
-      </p:par>
-    </p:tnLst>
-  </p:timing>
-</p:sld>
-</file>
-
-<file path=ppt/slides/slide16.xml><?xml version="1.0" encoding="utf-8"?>
-<p:sld xmlns:a="http://schemas.openxmlformats.org/drawingml/2006/main" xmlns:r="http://schemas.openxmlformats.org/officeDocument/2006/relationships" xmlns:p="http://schemas.openxmlformats.org/presentationml/2006/main">
-  <p:cSld>
-    <p:spTree>
-      <p:nvGrpSpPr>
-        <p:cNvPr id="1" name=""/>
-        <p:cNvGrpSpPr/>
-        <p:nvPr/>
-      </p:nvGrpSpPr>
-      <p:grpSpPr>
-        <a:xfrm>
-          <a:off x="0" y="0"/>
-          <a:ext cx="0" cy="0"/>
-          <a:chOff x="0" y="0"/>
-          <a:chExt cx="0" cy="0"/>
-        </a:xfrm>
-      </p:grpSpPr>
-      <p:sp>
-        <p:nvSpPr>
           <p:cNvPr id="2" name="Titre 1"/>
           <p:cNvSpPr>
             <a:spLocks noGrp="1"/>
@@ -5657,33 +5500,32 @@
             </a:r>
           </a:p>
           <a:p>
-            <a:pPr lvl="1"/>
             <a:r>
               <a:rPr lang="fr-FR" altLang="fr-FR" dirty="0" err="1" smtClean="0"/>
               <a:t>Angular</a:t>
             </a:r>
             <a:r>
               <a:rPr lang="fr-FR" altLang="fr-FR" dirty="0" smtClean="0"/>
-              <a:t> JS 1.1 : 2013 </a:t>
+              <a:t> </a:t>
+            </a:r>
+            <a:r>
+              <a:rPr lang="fr-FR" altLang="fr-FR" dirty="0" smtClean="0"/>
+              <a:t>2 : 2016 Nouveau </a:t>
             </a:r>
             <a:r>
               <a:rPr lang="fr-FR" altLang="fr-FR" dirty="0" err="1" smtClean="0"/>
-              <a:t>ngController</a:t>
-            </a:r>
-            <a:r>
-              <a:rPr lang="fr-FR" altLang="fr-FR" dirty="0" smtClean="0"/>
-              <a:t> as</a:t>
-            </a:r>
-          </a:p>
-          <a:p>
-            <a:pPr lvl="1"/>
+              <a:t>framework</a:t>
+            </a:r>
+            <a:endParaRPr lang="fr-FR" altLang="fr-FR" dirty="0" smtClean="0"/>
+          </a:p>
+          <a:p>
             <a:r>
               <a:rPr lang="fr-FR" altLang="fr-FR" dirty="0" err="1" smtClean="0"/>
               <a:t>Angular</a:t>
             </a:r>
             <a:r>
               <a:rPr lang="fr-FR" altLang="fr-FR" dirty="0" smtClean="0"/>
-              <a:t> JS 1.2 </a:t>
+              <a:t> 4 </a:t>
             </a:r>
             <a:r>
               <a:rPr lang="fr-FR" altLang="fr-FR" dirty="0"/>
@@ -5691,143 +5533,74 @@
             </a:r>
             <a:r>
               <a:rPr lang="fr-FR" altLang="fr-FR" dirty="0" smtClean="0"/>
-              <a:t>2014 </a:t>
-            </a:r>
+              <a:t>2017 </a:t>
+            </a:r>
+            <a:r>
+              <a:rPr lang="fr-FR" altLang="fr-FR" dirty="0" err="1" smtClean="0"/>
+              <a:t>HttpClient</a:t>
+            </a:r>
+            <a:endParaRPr lang="fr-FR" altLang="fr-FR" dirty="0" smtClean="0"/>
+          </a:p>
+          <a:p>
             <a:r>
               <a:rPr lang="fr-FR" altLang="fr-FR" dirty="0" err="1"/>
-              <a:t>ngAnimate</a:t>
-            </a:r>
-            <a:endParaRPr lang="fr-FR" altLang="fr-FR" dirty="0" smtClean="0"/>
-          </a:p>
-          <a:p>
-            <a:pPr lvl="1"/>
+              <a:t>Angular</a:t>
+            </a:r>
+            <a:r>
+              <a:rPr lang="fr-FR" altLang="fr-FR" dirty="0"/>
+              <a:t> 5</a:t>
+            </a:r>
+            <a:r>
+              <a:rPr lang="fr-FR" altLang="fr-FR" dirty="0" smtClean="0"/>
+              <a:t> </a:t>
+            </a:r>
+            <a:r>
+              <a:rPr lang="fr-FR" altLang="fr-FR" dirty="0"/>
+              <a:t>: </a:t>
+            </a:r>
+            <a:r>
+              <a:rPr lang="fr-FR" altLang="fr-FR" dirty="0" smtClean="0"/>
+              <a:t>2017 Progressive Web</a:t>
+            </a:r>
+          </a:p>
+          <a:p>
             <a:r>
               <a:rPr lang="fr-FR" altLang="fr-FR" dirty="0" err="1" smtClean="0"/>
               <a:t>Angular</a:t>
             </a:r>
             <a:r>
               <a:rPr lang="fr-FR" altLang="fr-FR" dirty="0" smtClean="0"/>
-              <a:t> JS 1.3 : 2014 </a:t>
+              <a:t> 6 : 2018 </a:t>
             </a:r>
             <a:r>
               <a:rPr lang="fr-FR" altLang="fr-FR" dirty="0" err="1" smtClean="0"/>
-              <a:t>ngModelOptions</a:t>
-            </a:r>
-            <a:r>
-              <a:rPr lang="fr-FR" altLang="fr-FR" dirty="0" smtClean="0"/>
-              <a:t> et date</a:t>
-            </a:r>
-          </a:p>
-          <a:p>
-            <a:pPr lvl="1"/>
+              <a:t>RxJS</a:t>
+            </a:r>
+            <a:endParaRPr lang="fr-FR" altLang="fr-FR" dirty="0" smtClean="0"/>
+          </a:p>
+          <a:p>
             <a:r>
               <a:rPr lang="fr-FR" altLang="fr-FR" dirty="0" err="1" smtClean="0"/>
               <a:t>Angular</a:t>
             </a:r>
             <a:r>
               <a:rPr lang="fr-FR" altLang="fr-FR" dirty="0" smtClean="0"/>
-              <a:t> JS 1.4 : 2015 </a:t>
-            </a:r>
-            <a:r>
-              <a:rPr lang="fr-FR" altLang="fr-FR" dirty="0" err="1" smtClean="0"/>
-              <a:t>ngNewRoute</a:t>
+              <a:t> 7 : 2018 CLI avec options</a:t>
             </a:r>
             <a:endParaRPr lang="fr-FR" altLang="fr-FR" dirty="0" smtClean="0"/>
           </a:p>
           <a:p>
-            <a:pPr lvl="1"/>
             <a:r>
               <a:rPr lang="fr-FR" altLang="fr-FR" dirty="0" err="1" smtClean="0"/>
               <a:t>Angular</a:t>
             </a:r>
             <a:r>
               <a:rPr lang="fr-FR" altLang="fr-FR" dirty="0" smtClean="0"/>
-              <a:t> JS 1.5 : 2015 components</a:t>
-            </a:r>
-          </a:p>
-          <a:p>
-            <a:pPr lvl="1"/>
+              <a:t> 8 : 2019 </a:t>
+            </a:r>
             <a:r>
               <a:rPr lang="fr-FR" altLang="fr-FR" dirty="0" err="1" smtClean="0"/>
-              <a:t>Angular</a:t>
-            </a:r>
-            <a:r>
-              <a:rPr lang="fr-FR" altLang="fr-FR" dirty="0" smtClean="0"/>
-              <a:t> JS 1.6 : 2016 Components</a:t>
-            </a:r>
-          </a:p>
-          <a:p>
-            <a:r>
-              <a:rPr lang="fr-FR" altLang="fr-FR" dirty="0" err="1" smtClean="0"/>
-              <a:t>Angular</a:t>
-            </a:r>
-            <a:r>
-              <a:rPr lang="fr-FR" altLang="fr-FR" dirty="0" smtClean="0"/>
-              <a:t> 2 : 2016 Nouveau </a:t>
-            </a:r>
-            <a:r>
-              <a:rPr lang="fr-FR" altLang="fr-FR" dirty="0" err="1" smtClean="0"/>
-              <a:t>framework</a:t>
-            </a:r>
-            <a:endParaRPr lang="fr-FR" altLang="fr-FR" dirty="0" smtClean="0"/>
-          </a:p>
-          <a:p>
-            <a:r>
-              <a:rPr lang="fr-FR" altLang="fr-FR" dirty="0" err="1" smtClean="0"/>
-              <a:t>Angular</a:t>
-            </a:r>
-            <a:r>
-              <a:rPr lang="fr-FR" altLang="fr-FR" dirty="0" smtClean="0"/>
-              <a:t> 4 </a:t>
-            </a:r>
-            <a:r>
-              <a:rPr lang="fr-FR" altLang="fr-FR" dirty="0"/>
-              <a:t>: </a:t>
-            </a:r>
-            <a:r>
-              <a:rPr lang="fr-FR" altLang="fr-FR" dirty="0" smtClean="0"/>
-              <a:t>2017 </a:t>
-            </a:r>
-            <a:r>
-              <a:rPr lang="fr-FR" altLang="fr-FR" dirty="0" err="1" smtClean="0"/>
-              <a:t>HttpClient</a:t>
-            </a:r>
-            <a:endParaRPr lang="fr-FR" altLang="fr-FR" dirty="0" smtClean="0"/>
-          </a:p>
-          <a:p>
-            <a:r>
-              <a:rPr lang="fr-FR" altLang="fr-FR" dirty="0" err="1"/>
-              <a:t>Angular</a:t>
-            </a:r>
-            <a:r>
-              <a:rPr lang="fr-FR" altLang="fr-FR" dirty="0"/>
-              <a:t> 5</a:t>
-            </a:r>
-            <a:r>
-              <a:rPr lang="fr-FR" altLang="fr-FR" dirty="0" smtClean="0"/>
-              <a:t> </a:t>
-            </a:r>
-            <a:r>
-              <a:rPr lang="fr-FR" altLang="fr-FR" dirty="0"/>
-              <a:t>: </a:t>
-            </a:r>
-            <a:r>
-              <a:rPr lang="fr-FR" altLang="fr-FR" dirty="0" smtClean="0"/>
-              <a:t>2017 Progressive Web</a:t>
-            </a:r>
-          </a:p>
-          <a:p>
-            <a:r>
-              <a:rPr lang="fr-FR" altLang="fr-FR" dirty="0" err="1" smtClean="0"/>
-              <a:t>Angular</a:t>
-            </a:r>
-            <a:r>
-              <a:rPr lang="fr-FR" altLang="fr-FR" dirty="0" smtClean="0"/>
-              <a:t> 6 : 2018 </a:t>
-            </a:r>
-            <a:r>
-              <a:rPr lang="fr-FR" altLang="fr-FR" dirty="0" err="1" smtClean="0"/>
-              <a:t>RxJS</a:t>
+              <a:t>Yvi</a:t>
             </a:r>
             <a:endParaRPr lang="fr-FR" altLang="fr-FR" dirty="0"/>
           </a:p>

</xml_diff>